<commit_message>
car Rental Application 1
</commit_message>
<xml_diff>
--- a/Orgray Car Rental Application PPT- Team Innova cloud.pptx
+++ b/Orgray Car Rental Application PPT- Team Innova cloud.pptx
@@ -210,7 +210,7 @@
           <a:p>
             <a:fld id="{3F96E69F-9C9A-4E01-BBB9-EFBF03D1DF9B}" type="datetimeFigureOut">
               <a:rPr lang="en-US" smtClean="0"/>
-              <a:t>11/28/2023</a:t>
+              <a:t>4/12/2024</a:t>
             </a:fld>
             <a:endParaRPr lang="en-US"/>
           </a:p>
@@ -985,7 +985,7 @@
           <a:p>
             <a:fld id="{724B31C3-6FD8-4335-AF12-223CD455FFD5}" type="datetime1">
               <a:rPr lang="en-US" smtClean="0"/>
-              <a:t>11/28/2023</a:t>
+              <a:t>4/12/2024</a:t>
             </a:fld>
             <a:endParaRPr lang="en-US"/>
           </a:p>
@@ -1967,7 +1967,7 @@
           <a:p>
             <a:fld id="{075040C2-5944-436C-9FF1-62D793D6EB9F}" type="datetime1">
               <a:rPr lang="en-US" smtClean="0"/>
-              <a:t>11/28/2023</a:t>
+              <a:t>4/12/2024</a:t>
             </a:fld>
             <a:endParaRPr lang="en-US"/>
           </a:p>
@@ -2837,7 +2837,7 @@
           <a:p>
             <a:fld id="{44B07AE7-DFFE-46BA-8FAC-75B595539C27}" type="datetime1">
               <a:rPr lang="en-US" smtClean="0"/>
-              <a:t>11/28/2023</a:t>
+              <a:t>4/12/2024</a:t>
             </a:fld>
             <a:endParaRPr lang="en-US"/>
           </a:p>
@@ -3858,7 +3858,7 @@
           <a:p>
             <a:fld id="{D2C260E8-D667-4D39-A07D-903D980E8454}" type="datetime1">
               <a:rPr lang="en-US" smtClean="0"/>
-              <a:t>11/28/2023</a:t>
+              <a:t>4/12/2024</a:t>
             </a:fld>
             <a:endParaRPr lang="en-US"/>
           </a:p>
@@ -4778,7 +4778,7 @@
           <a:p>
             <a:fld id="{A9A87D4E-BED1-4635-8C8A-23CEB7DE21E1}" type="datetime1">
               <a:rPr lang="en-US" smtClean="0"/>
-              <a:t>11/28/2023</a:t>
+              <a:t>4/12/2024</a:t>
             </a:fld>
             <a:endParaRPr lang="en-US"/>
           </a:p>
@@ -5434,7 +5434,7 @@
           <a:p>
             <a:fld id="{56931A8B-163E-4C48-B228-4F1F9B4C22A3}" type="datetime1">
               <a:rPr lang="en-US" smtClean="0"/>
-              <a:t>11/28/2023</a:t>
+              <a:t>4/12/2024</a:t>
             </a:fld>
             <a:endParaRPr lang="en-US"/>
           </a:p>
@@ -6291,7 +6291,7 @@
           <a:p>
             <a:fld id="{07F92806-8778-4963-AA59-039D0F114178}" type="datetime1">
               <a:rPr lang="en-US" smtClean="0"/>
-              <a:t>11/28/2023</a:t>
+              <a:t>4/12/2024</a:t>
             </a:fld>
             <a:endParaRPr lang="en-US"/>
           </a:p>
@@ -6474,7 +6474,7 @@
           <a:p>
             <a:fld id="{CB951D8A-A0A3-4A27-B06C-3E6CBAB22EE7}" type="datetime1">
               <a:rPr lang="en-US" smtClean="0"/>
-              <a:t>11/28/2023</a:t>
+              <a:t>4/12/2024</a:t>
             </a:fld>
             <a:endParaRPr lang="en-US"/>
           </a:p>
@@ -7331,7 +7331,7 @@
           <a:p>
             <a:fld id="{A4EE0B09-6615-4333-8739-C9AC5176FDBF}" type="datetime1">
               <a:rPr lang="en-US" smtClean="0"/>
-              <a:t>11/28/2023</a:t>
+              <a:t>4/12/2024</a:t>
             </a:fld>
             <a:endParaRPr lang="en-US"/>
           </a:p>
@@ -7550,7 +7550,7 @@
           <a:p>
             <a:fld id="{F6DB0110-BAA2-4623-AC61-DC03453A3854}" type="datetime1">
               <a:rPr lang="en-US" smtClean="0"/>
-              <a:t>11/28/2023</a:t>
+              <a:t>4/12/2024</a:t>
             </a:fld>
             <a:endParaRPr lang="en-US"/>
           </a:p>
@@ -8475,7 +8475,7 @@
           <a:p>
             <a:fld id="{E67D2ADC-1043-498F-A63D-3FAC4D388E1B}" type="datetime1">
               <a:rPr lang="en-US" smtClean="0"/>
-              <a:t>11/28/2023</a:t>
+              <a:t>4/12/2024</a:t>
             </a:fld>
             <a:endParaRPr lang="en-US"/>
           </a:p>
@@ -8759,7 +8759,7 @@
           <a:p>
             <a:fld id="{F3006ED3-F18E-4464-8385-D8359CD8B564}" type="datetime1">
               <a:rPr lang="en-US" smtClean="0"/>
-              <a:t>11/28/2023</a:t>
+              <a:t>4/12/2024</a:t>
             </a:fld>
             <a:endParaRPr lang="en-US"/>
           </a:p>
@@ -9149,7 +9149,7 @@
           <a:p>
             <a:fld id="{7276C5D0-D604-48A9-92F9-7F50D0F801FA}" type="datetime1">
               <a:rPr lang="en-US" smtClean="0"/>
-              <a:t>11/28/2023</a:t>
+              <a:t>4/12/2024</a:t>
             </a:fld>
             <a:endParaRPr lang="en-US"/>
           </a:p>
@@ -9275,7 +9275,7 @@
           <a:p>
             <a:fld id="{F2435C6A-9DF5-4305-95BB-059AA218D8EE}" type="datetime1">
               <a:rPr lang="en-US" smtClean="0"/>
-              <a:t>11/28/2023</a:t>
+              <a:t>4/12/2024</a:t>
             </a:fld>
             <a:endParaRPr lang="en-US"/>
           </a:p>
@@ -9370,7 +9370,7 @@
           <a:p>
             <a:fld id="{8E9BD466-39C3-42B8-918B-42AD002A779B}" type="datetime1">
               <a:rPr lang="en-US" smtClean="0"/>
-              <a:t>11/28/2023</a:t>
+              <a:t>4/12/2024</a:t>
             </a:fld>
             <a:endParaRPr lang="en-US"/>
           </a:p>
@@ -10341,7 +10341,7 @@
           <a:p>
             <a:fld id="{CEF93D13-BE46-4306-BCDD-7718F8AEF0FD}" type="datetime1">
               <a:rPr lang="en-US" smtClean="0"/>
-              <a:t>11/28/2023</a:t>
+              <a:t>4/12/2024</a:t>
             </a:fld>
             <a:endParaRPr lang="en-US"/>
           </a:p>
@@ -11336,7 +11336,7 @@
           <a:p>
             <a:fld id="{EE5688CF-1280-4440-9389-46815B404353}" type="datetime1">
               <a:rPr lang="en-US" smtClean="0"/>
-              <a:t>11/28/2023</a:t>
+              <a:t>4/12/2024</a:t>
             </a:fld>
             <a:endParaRPr lang="en-US"/>
           </a:p>
@@ -12220,7 +12220,7 @@
           <a:p>
             <a:fld id="{AC8C94ED-5305-46F6-90B6-5F08262C31D5}" type="datetime1">
               <a:rPr lang="en-US" smtClean="0"/>
-              <a:t>11/28/2023</a:t>
+              <a:t>4/12/2024</a:t>
             </a:fld>
             <a:endParaRPr lang="en-US"/>
           </a:p>
@@ -12875,22 +12875,11 @@
           </a:p>
           <a:p>
             <a:pPr algn="ctr"/>
-            <a:endParaRPr lang="en-US" dirty="0">
+            <a:endParaRPr lang="en-US" sz="1400" dirty="0">
               <a:solidFill>
                 <a:schemeClr val="bg1"/>
               </a:solidFill>
             </a:endParaRPr>
-          </a:p>
-          <a:p>
-            <a:pPr algn="ctr"/>
-            <a:r>
-              <a:rPr lang="en-US" sz="1400" dirty="0">
-                <a:solidFill>
-                  <a:schemeClr val="bg1"/>
-                </a:solidFill>
-              </a:rPr>
-              <a:t>Group Members</a:t>
-            </a:r>
           </a:p>
           <a:p>
             <a:pPr algn="ctr"/>
@@ -12912,84 +12901,6 @@
               </a:rPr>
               <a:t>700754515</a:t>
             </a:r>
-          </a:p>
-          <a:p>
-            <a:pPr algn="ctr"/>
-            <a:r>
-              <a:rPr lang="en-US" dirty="0">
-                <a:solidFill>
-                  <a:schemeClr val="bg1"/>
-                </a:solidFill>
-              </a:rPr>
-              <a:t>Rahul Solleti 				   </a:t>
-            </a:r>
-            <a:r>
-              <a:rPr lang="en-US" sz="1800" dirty="0">
-                <a:solidFill>
-                  <a:schemeClr val="bg1"/>
-                </a:solidFill>
-                <a:effectLst/>
-                <a:ea typeface="Times New Roman" panose="02020603050405020304" pitchFamily="18" charset="0"/>
-              </a:rPr>
-              <a:t>700756485</a:t>
-            </a:r>
-            <a:endParaRPr lang="en-US" dirty="0">
-              <a:solidFill>
-                <a:schemeClr val="bg1"/>
-              </a:solidFill>
-            </a:endParaRPr>
-          </a:p>
-          <a:p>
-            <a:pPr algn="ctr"/>
-            <a:r>
-              <a:rPr lang="en-US" dirty="0">
-                <a:solidFill>
-                  <a:schemeClr val="bg1"/>
-                </a:solidFill>
-              </a:rPr>
-              <a:t>Sony Harshitha Avula           </a:t>
-            </a:r>
-            <a:r>
-              <a:rPr lang="en-US" sz="1800" dirty="0">
-                <a:solidFill>
-                  <a:schemeClr val="bg1"/>
-                </a:solidFill>
-                <a:effectLst/>
-                <a:ea typeface="Times New Roman" panose="02020603050405020304" pitchFamily="18" charset="0"/>
-              </a:rPr>
-              <a:t>700759101</a:t>
-            </a:r>
-            <a:endParaRPr lang="en-US" dirty="0">
-              <a:solidFill>
-                <a:schemeClr val="bg1"/>
-              </a:solidFill>
-            </a:endParaRPr>
-          </a:p>
-          <a:p>
-            <a:pPr algn="ctr"/>
-            <a:r>
-              <a:rPr lang="en-US" dirty="0">
-                <a:solidFill>
-                  <a:schemeClr val="bg1"/>
-                </a:solidFill>
-              </a:rPr>
-              <a:t>Rithika Dundigalla		   </a:t>
-            </a:r>
-            <a:r>
-              <a:rPr lang="en-US" sz="1800" dirty="0">
-                <a:solidFill>
-                  <a:schemeClr val="bg1"/>
-                </a:solidFill>
-                <a:effectLst/>
-                <a:ea typeface="Times New Roman" panose="02020603050405020304" pitchFamily="18" charset="0"/>
-              </a:rPr>
-              <a:t>700757951</a:t>
-            </a:r>
-            <a:endParaRPr lang="en-US" dirty="0">
-              <a:solidFill>
-                <a:schemeClr val="bg1"/>
-              </a:solidFill>
-            </a:endParaRPr>
           </a:p>
         </p:txBody>
       </p:sp>

</xml_diff>